<commit_message>
powerpoint update with reduction
</commit_message>
<xml_diff>
--- a/problem_presentation.pptx
+++ b/problem_presentation.pptx
@@ -7,6 +7,9 @@
   <p:sldIdLst>
     <p:sldId id="256" r:id="rId2"/>
     <p:sldId id="257" r:id="rId3"/>
+    <p:sldId id="258" r:id="rId4"/>
+    <p:sldId id="259" r:id="rId5"/>
+    <p:sldId id="260" r:id="rId6"/>
   </p:sldIdLst>
   <p:sldSz cx="12192000" cy="6858000"/>
   <p:notesSz cx="6858000" cy="9144000"/>
@@ -262,7 +265,7 @@
           <a:p>
             <a:fld id="{7E5A36A6-AF8C-4D74-B4ED-EE1D5753B021}" type="datetimeFigureOut">
               <a:rPr lang="hu-HU" smtClean="0"/>
-              <a:t>2022. 04. 25.</a:t>
+              <a:t>2022. 04. 27.</a:t>
             </a:fld>
             <a:endParaRPr lang="hu-HU"/>
           </a:p>
@@ -462,7 +465,7 @@
           <a:p>
             <a:fld id="{7E5A36A6-AF8C-4D74-B4ED-EE1D5753B021}" type="datetimeFigureOut">
               <a:rPr lang="hu-HU" smtClean="0"/>
-              <a:t>2022. 04. 25.</a:t>
+              <a:t>2022. 04. 27.</a:t>
             </a:fld>
             <a:endParaRPr lang="hu-HU"/>
           </a:p>
@@ -672,7 +675,7 @@
           <a:p>
             <a:fld id="{7E5A36A6-AF8C-4D74-B4ED-EE1D5753B021}" type="datetimeFigureOut">
               <a:rPr lang="hu-HU" smtClean="0"/>
-              <a:t>2022. 04. 25.</a:t>
+              <a:t>2022. 04. 27.</a:t>
             </a:fld>
             <a:endParaRPr lang="hu-HU"/>
           </a:p>
@@ -872,7 +875,7 @@
           <a:p>
             <a:fld id="{7E5A36A6-AF8C-4D74-B4ED-EE1D5753B021}" type="datetimeFigureOut">
               <a:rPr lang="hu-HU" smtClean="0"/>
-              <a:t>2022. 04. 25.</a:t>
+              <a:t>2022. 04. 27.</a:t>
             </a:fld>
             <a:endParaRPr lang="hu-HU"/>
           </a:p>
@@ -1148,7 +1151,7 @@
           <a:p>
             <a:fld id="{7E5A36A6-AF8C-4D74-B4ED-EE1D5753B021}" type="datetimeFigureOut">
               <a:rPr lang="hu-HU" smtClean="0"/>
-              <a:t>2022. 04. 25.</a:t>
+              <a:t>2022. 04. 27.</a:t>
             </a:fld>
             <a:endParaRPr lang="hu-HU"/>
           </a:p>
@@ -1416,7 +1419,7 @@
           <a:p>
             <a:fld id="{7E5A36A6-AF8C-4D74-B4ED-EE1D5753B021}" type="datetimeFigureOut">
               <a:rPr lang="hu-HU" smtClean="0"/>
-              <a:t>2022. 04. 25.</a:t>
+              <a:t>2022. 04. 27.</a:t>
             </a:fld>
             <a:endParaRPr lang="hu-HU"/>
           </a:p>
@@ -1831,7 +1834,7 @@
           <a:p>
             <a:fld id="{7E5A36A6-AF8C-4D74-B4ED-EE1D5753B021}" type="datetimeFigureOut">
               <a:rPr lang="hu-HU" smtClean="0"/>
-              <a:t>2022. 04. 25.</a:t>
+              <a:t>2022. 04. 27.</a:t>
             </a:fld>
             <a:endParaRPr lang="hu-HU"/>
           </a:p>
@@ -1973,7 +1976,7 @@
           <a:p>
             <a:fld id="{7E5A36A6-AF8C-4D74-B4ED-EE1D5753B021}" type="datetimeFigureOut">
               <a:rPr lang="hu-HU" smtClean="0"/>
-              <a:t>2022. 04. 25.</a:t>
+              <a:t>2022. 04. 27.</a:t>
             </a:fld>
             <a:endParaRPr lang="hu-HU"/>
           </a:p>
@@ -2086,7 +2089,7 @@
           <a:p>
             <a:fld id="{7E5A36A6-AF8C-4D74-B4ED-EE1D5753B021}" type="datetimeFigureOut">
               <a:rPr lang="hu-HU" smtClean="0"/>
-              <a:t>2022. 04. 25.</a:t>
+              <a:t>2022. 04. 27.</a:t>
             </a:fld>
             <a:endParaRPr lang="hu-HU"/>
           </a:p>
@@ -2399,7 +2402,7 @@
           <a:p>
             <a:fld id="{7E5A36A6-AF8C-4D74-B4ED-EE1D5753B021}" type="datetimeFigureOut">
               <a:rPr lang="hu-HU" smtClean="0"/>
-              <a:t>2022. 04. 25.</a:t>
+              <a:t>2022. 04. 27.</a:t>
             </a:fld>
             <a:endParaRPr lang="hu-HU"/>
           </a:p>
@@ -2688,7 +2691,7 @@
           <a:p>
             <a:fld id="{7E5A36A6-AF8C-4D74-B4ED-EE1D5753B021}" type="datetimeFigureOut">
               <a:rPr lang="hu-HU" smtClean="0"/>
-              <a:t>2022. 04. 25.</a:t>
+              <a:t>2022. 04. 27.</a:t>
             </a:fld>
             <a:endParaRPr lang="hu-HU"/>
           </a:p>
@@ -2931,7 +2934,7 @@
           <a:p>
             <a:fld id="{7E5A36A6-AF8C-4D74-B4ED-EE1D5753B021}" type="datetimeFigureOut">
               <a:rPr lang="hu-HU" smtClean="0"/>
-              <a:t>2022. 04. 25.</a:t>
+              <a:t>2022. 04. 27.</a:t>
             </a:fld>
             <a:endParaRPr lang="hu-HU"/>
           </a:p>
@@ -3409,7 +3412,7 @@
                 <a:latin typeface="Segoe UI" panose="020B0502040204020203" pitchFamily="34" charset="0"/>
                 <a:cs typeface="Segoe UI" panose="020B0502040204020203" pitchFamily="34" charset="0"/>
               </a:rPr>
-              <a:t>subtitle</a:t>
+              <a:t>Sam, Ben, Chris, Gavin</a:t>
             </a:r>
             <a:endParaRPr lang="hu-HU" dirty="0">
               <a:latin typeface="Segoe UI" panose="020B0502040204020203" pitchFamily="34" charset="0"/>
@@ -4441,6 +4444,986 @@
 </p:sld>
 </file>
 
+<file path=ppt/slides/slide3.xml><?xml version="1.0" encoding="utf-8"?>
+<p:sld xmlns:a="http://schemas.openxmlformats.org/drawingml/2006/main" xmlns:r="http://schemas.openxmlformats.org/officeDocument/2006/relationships" xmlns:p="http://schemas.openxmlformats.org/presentationml/2006/main">
+  <p:cSld>
+    <p:spTree>
+      <p:nvGrpSpPr>
+        <p:cNvPr id="1" name=""/>
+        <p:cNvGrpSpPr/>
+        <p:nvPr/>
+      </p:nvGrpSpPr>
+      <p:grpSpPr>
+        <a:xfrm>
+          <a:off x="0" y="0"/>
+          <a:ext cx="0" cy="0"/>
+          <a:chOff x="0" y="0"/>
+          <a:chExt cx="0" cy="0"/>
+        </a:xfrm>
+      </p:grpSpPr>
+      <p:sp>
+        <p:nvSpPr>
+          <p:cNvPr id="4" name="Rectangle: Rounded Corners 3">
+            <a:extLst>
+              <a:ext uri="{FF2B5EF4-FFF2-40B4-BE49-F238E27FC236}">
+                <a16:creationId xmlns:a16="http://schemas.microsoft.com/office/drawing/2014/main" id="{646CC432-DEDD-478C-8289-64F4545C5DDF}"/>
+              </a:ext>
+            </a:extLst>
+          </p:cNvPr>
+          <p:cNvSpPr/>
+          <p:nvPr/>
+        </p:nvSpPr>
+        <p:spPr>
+          <a:xfrm>
+            <a:off x="628650" y="1494692"/>
+            <a:ext cx="6541476" cy="4682271"/>
+          </a:xfrm>
+          <a:prstGeom prst="roundRect">
+            <a:avLst/>
+          </a:prstGeom>
+          <a:solidFill>
+            <a:schemeClr val="bg1">
+              <a:lumMod val="95000"/>
+            </a:schemeClr>
+          </a:solidFill>
+          <a:ln>
+            <a:noFill/>
+          </a:ln>
+          <a:effectLst>
+            <a:outerShdw blurRad="50800" dist="38100" dir="2700000" algn="tl" rotWithShape="0">
+              <a:prstClr val="black">
+                <a:alpha val="40000"/>
+              </a:prstClr>
+            </a:outerShdw>
+          </a:effectLst>
+        </p:spPr>
+        <p:style>
+          <a:lnRef idx="2">
+            <a:schemeClr val="accent1">
+              <a:shade val="50000"/>
+            </a:schemeClr>
+          </a:lnRef>
+          <a:fillRef idx="1">
+            <a:schemeClr val="accent1"/>
+          </a:fillRef>
+          <a:effectRef idx="0">
+            <a:schemeClr val="accent1"/>
+          </a:effectRef>
+          <a:fontRef idx="minor">
+            <a:schemeClr val="lt1"/>
+          </a:fontRef>
+        </p:style>
+        <p:txBody>
+          <a:bodyPr rtlCol="0" anchor="ctr"/>
+          <a:lstStyle/>
+          <a:p>
+            <a:pPr algn="ctr"/>
+            <a:endParaRPr lang="hu-HU"/>
+          </a:p>
+        </p:txBody>
+      </p:sp>
+      <p:sp>
+        <p:nvSpPr>
+          <p:cNvPr id="2" name="Title 1">
+            <a:extLst>
+              <a:ext uri="{FF2B5EF4-FFF2-40B4-BE49-F238E27FC236}">
+                <a16:creationId xmlns:a16="http://schemas.microsoft.com/office/drawing/2014/main" id="{9C508B4B-FACF-42E2-8E36-496ABB6FEA31}"/>
+              </a:ext>
+            </a:extLst>
+          </p:cNvPr>
+          <p:cNvSpPr>
+            <a:spLocks noGrp="1"/>
+          </p:cNvSpPr>
+          <p:nvPr>
+            <p:ph type="title"/>
+          </p:nvPr>
+        </p:nvSpPr>
+        <p:spPr>
+          <a:xfrm>
+            <a:off x="838200" y="365125"/>
+            <a:ext cx="6331926" cy="1325563"/>
+          </a:xfrm>
+        </p:spPr>
+        <p:txBody>
+          <a:bodyPr/>
+          <a:lstStyle/>
+          <a:p>
+            <a:r>
+              <a:rPr lang="en-US" dirty="0">
+                <a:latin typeface="Segoe UI Semibold" panose="020B0702040204020203" pitchFamily="34" charset="0"/>
+                <a:cs typeface="Segoe UI Semibold" panose="020B0702040204020203" pitchFamily="34" charset="0"/>
+              </a:rPr>
+              <a:t>Sample Input</a:t>
+            </a:r>
+            <a:endParaRPr lang="hu-HU" dirty="0">
+              <a:latin typeface="Segoe UI Semibold" panose="020B0702040204020203" pitchFamily="34" charset="0"/>
+              <a:cs typeface="Segoe UI Semibold" panose="020B0702040204020203" pitchFamily="34" charset="0"/>
+            </a:endParaRPr>
+          </a:p>
+        </p:txBody>
+      </p:sp>
+      <p:sp>
+        <p:nvSpPr>
+          <p:cNvPr id="3" name="Content Placeholder 2">
+            <a:extLst>
+              <a:ext uri="{FF2B5EF4-FFF2-40B4-BE49-F238E27FC236}">
+                <a16:creationId xmlns:a16="http://schemas.microsoft.com/office/drawing/2014/main" id="{1C3EB100-A0AE-4D03-8FF5-296623074D43}"/>
+              </a:ext>
+            </a:extLst>
+          </p:cNvPr>
+          <p:cNvSpPr>
+            <a:spLocks noGrp="1"/>
+          </p:cNvSpPr>
+          <p:nvPr>
+            <p:ph idx="1"/>
+          </p:nvPr>
+        </p:nvSpPr>
+        <p:spPr>
+          <a:xfrm>
+            <a:off x="838199" y="1825625"/>
+            <a:ext cx="6331927" cy="4351338"/>
+          </a:xfrm>
+        </p:spPr>
+        <p:txBody>
+          <a:bodyPr/>
+          <a:lstStyle/>
+          <a:p>
+            <a:pPr marL="0" indent="0">
+              <a:buNone/>
+            </a:pPr>
+            <a:r>
+              <a:rPr lang="en-US" dirty="0">
+                <a:latin typeface="Segoe UI" panose="020B0502040204020203" pitchFamily="34" charset="0"/>
+                <a:cs typeface="Segoe UI" panose="020B0502040204020203" pitchFamily="34" charset="0"/>
+              </a:rPr>
+              <a:t>The input is formatted in the same way as lab 9: acyclic detection:</a:t>
+            </a:r>
+          </a:p>
+          <a:p>
+            <a:pPr marL="0" indent="0">
+              <a:buNone/>
+            </a:pPr>
+            <a:r>
+              <a:rPr lang="en-US" sz="2200" dirty="0">
+                <a:latin typeface="Segoe UI" panose="020B0502040204020203" pitchFamily="34" charset="0"/>
+                <a:cs typeface="Segoe UI" panose="020B0502040204020203" pitchFamily="34" charset="0"/>
+              </a:rPr>
+              <a:t>The first line is an integer n representing the number of vertices in the graph.</a:t>
+            </a:r>
+          </a:p>
+          <a:p>
+            <a:pPr marL="0" indent="0">
+              <a:buNone/>
+            </a:pPr>
+            <a:r>
+              <a:rPr lang="en-US" sz="2200" dirty="0">
+                <a:latin typeface="Segoe UI" panose="020B0502040204020203" pitchFamily="34" charset="0"/>
+                <a:cs typeface="Segoe UI" panose="020B0502040204020203" pitchFamily="34" charset="0"/>
+              </a:rPr>
+              <a:t>The next n lines begin with an integer representing the source vertex, followed by up to n – 1 integers (which range from 0 to n) representing destination nodes for the graph’s edges.</a:t>
+            </a:r>
+          </a:p>
+        </p:txBody>
+      </p:sp>
+      <p:grpSp>
+        <p:nvGrpSpPr>
+          <p:cNvPr id="10" name="Group 9">
+            <a:extLst>
+              <a:ext uri="{FF2B5EF4-FFF2-40B4-BE49-F238E27FC236}">
+                <a16:creationId xmlns:a16="http://schemas.microsoft.com/office/drawing/2014/main" id="{C5F40761-52AE-4954-B562-2630B3AC4F7A}"/>
+              </a:ext>
+            </a:extLst>
+          </p:cNvPr>
+          <p:cNvGrpSpPr/>
+          <p:nvPr/>
+        </p:nvGrpSpPr>
+        <p:grpSpPr>
+          <a:xfrm>
+            <a:off x="8598875" y="1206308"/>
+            <a:ext cx="2343152" cy="5259037"/>
+            <a:chOff x="7829548" y="1009529"/>
+            <a:chExt cx="2343152" cy="5259037"/>
+          </a:xfrm>
+        </p:grpSpPr>
+        <p:sp>
+          <p:nvSpPr>
+            <p:cNvPr id="21" name="Content Placeholder 2">
+              <a:extLst>
+                <a:ext uri="{FF2B5EF4-FFF2-40B4-BE49-F238E27FC236}">
+                  <a16:creationId xmlns:a16="http://schemas.microsoft.com/office/drawing/2014/main" id="{AD99ECFF-FED0-4740-BEEB-D3EE8FE57598}"/>
+                </a:ext>
+              </a:extLst>
+            </p:cNvPr>
+            <p:cNvSpPr txBox="1">
+              <a:spLocks/>
+            </p:cNvSpPr>
+            <p:nvPr/>
+          </p:nvSpPr>
+          <p:spPr>
+            <a:xfrm>
+              <a:off x="7829548" y="1009529"/>
+              <a:ext cx="2343152" cy="4351338"/>
+            </a:xfrm>
+            <a:prstGeom prst="rect">
+              <a:avLst/>
+            </a:prstGeom>
+          </p:spPr>
+          <p:txBody>
+            <a:bodyPr vert="horz" lIns="91440" tIns="45720" rIns="91440" bIns="45720" rtlCol="0">
+              <a:normAutofit lnSpcReduction="10000"/>
+            </a:bodyPr>
+            <a:lstStyle>
+              <a:lvl1pPr marL="228600" indent="-228600" algn="l" defTabSz="914400" rtl="0" eaLnBrk="1" latinLnBrk="0" hangingPunct="1">
+                <a:lnSpc>
+                  <a:spcPct val="90000"/>
+                </a:lnSpc>
+                <a:spcBef>
+                  <a:spcPts val="1000"/>
+                </a:spcBef>
+                <a:buFont typeface="Arial" panose="020B0604020202020204" pitchFamily="34" charset="0"/>
+                <a:buChar char="•"/>
+                <a:defRPr sz="2800" kern="1200">
+                  <a:solidFill>
+                    <a:schemeClr val="tx1"/>
+                  </a:solidFill>
+                  <a:latin typeface="+mn-lt"/>
+                  <a:ea typeface="+mn-ea"/>
+                  <a:cs typeface="+mn-cs"/>
+                </a:defRPr>
+              </a:lvl1pPr>
+              <a:lvl2pPr marL="685800" indent="-228600" algn="l" defTabSz="914400" rtl="0" eaLnBrk="1" latinLnBrk="0" hangingPunct="1">
+                <a:lnSpc>
+                  <a:spcPct val="90000"/>
+                </a:lnSpc>
+                <a:spcBef>
+                  <a:spcPts val="500"/>
+                </a:spcBef>
+                <a:buFont typeface="Arial" panose="020B0604020202020204" pitchFamily="34" charset="0"/>
+                <a:buChar char="•"/>
+                <a:defRPr sz="2400" kern="1200">
+                  <a:solidFill>
+                    <a:schemeClr val="tx1"/>
+                  </a:solidFill>
+                  <a:latin typeface="+mn-lt"/>
+                  <a:ea typeface="+mn-ea"/>
+                  <a:cs typeface="+mn-cs"/>
+                </a:defRPr>
+              </a:lvl2pPr>
+              <a:lvl3pPr marL="1143000" indent="-228600" algn="l" defTabSz="914400" rtl="0" eaLnBrk="1" latinLnBrk="0" hangingPunct="1">
+                <a:lnSpc>
+                  <a:spcPct val="90000"/>
+                </a:lnSpc>
+                <a:spcBef>
+                  <a:spcPts val="500"/>
+                </a:spcBef>
+                <a:buFont typeface="Arial" panose="020B0604020202020204" pitchFamily="34" charset="0"/>
+                <a:buChar char="•"/>
+                <a:defRPr sz="2000" kern="1200">
+                  <a:solidFill>
+                    <a:schemeClr val="tx1"/>
+                  </a:solidFill>
+                  <a:latin typeface="+mn-lt"/>
+                  <a:ea typeface="+mn-ea"/>
+                  <a:cs typeface="+mn-cs"/>
+                </a:defRPr>
+              </a:lvl3pPr>
+              <a:lvl4pPr marL="1600200" indent="-228600" algn="l" defTabSz="914400" rtl="0" eaLnBrk="1" latinLnBrk="0" hangingPunct="1">
+                <a:lnSpc>
+                  <a:spcPct val="90000"/>
+                </a:lnSpc>
+                <a:spcBef>
+                  <a:spcPts val="500"/>
+                </a:spcBef>
+                <a:buFont typeface="Arial" panose="020B0604020202020204" pitchFamily="34" charset="0"/>
+                <a:buChar char="•"/>
+                <a:defRPr sz="1800" kern="1200">
+                  <a:solidFill>
+                    <a:schemeClr val="tx1"/>
+                  </a:solidFill>
+                  <a:latin typeface="+mn-lt"/>
+                  <a:ea typeface="+mn-ea"/>
+                  <a:cs typeface="+mn-cs"/>
+                </a:defRPr>
+              </a:lvl4pPr>
+              <a:lvl5pPr marL="2057400" indent="-228600" algn="l" defTabSz="914400" rtl="0" eaLnBrk="1" latinLnBrk="0" hangingPunct="1">
+                <a:lnSpc>
+                  <a:spcPct val="90000"/>
+                </a:lnSpc>
+                <a:spcBef>
+                  <a:spcPts val="500"/>
+                </a:spcBef>
+                <a:buFont typeface="Arial" panose="020B0604020202020204" pitchFamily="34" charset="0"/>
+                <a:buChar char="•"/>
+                <a:defRPr sz="1800" kern="1200">
+                  <a:solidFill>
+                    <a:schemeClr val="tx1"/>
+                  </a:solidFill>
+                  <a:latin typeface="+mn-lt"/>
+                  <a:ea typeface="+mn-ea"/>
+                  <a:cs typeface="+mn-cs"/>
+                </a:defRPr>
+              </a:lvl5pPr>
+              <a:lvl6pPr marL="2514600" indent="-228600" algn="l" defTabSz="914400" rtl="0" eaLnBrk="1" latinLnBrk="0" hangingPunct="1">
+                <a:lnSpc>
+                  <a:spcPct val="90000"/>
+                </a:lnSpc>
+                <a:spcBef>
+                  <a:spcPts val="500"/>
+                </a:spcBef>
+                <a:buFont typeface="Arial" panose="020B0604020202020204" pitchFamily="34" charset="0"/>
+                <a:buChar char="•"/>
+                <a:defRPr sz="1800" kern="1200">
+                  <a:solidFill>
+                    <a:schemeClr val="tx1"/>
+                  </a:solidFill>
+                  <a:latin typeface="+mn-lt"/>
+                  <a:ea typeface="+mn-ea"/>
+                  <a:cs typeface="+mn-cs"/>
+                </a:defRPr>
+              </a:lvl6pPr>
+              <a:lvl7pPr marL="2971800" indent="-228600" algn="l" defTabSz="914400" rtl="0" eaLnBrk="1" latinLnBrk="0" hangingPunct="1">
+                <a:lnSpc>
+                  <a:spcPct val="90000"/>
+                </a:lnSpc>
+                <a:spcBef>
+                  <a:spcPts val="500"/>
+                </a:spcBef>
+                <a:buFont typeface="Arial" panose="020B0604020202020204" pitchFamily="34" charset="0"/>
+                <a:buChar char="•"/>
+                <a:defRPr sz="1800" kern="1200">
+                  <a:solidFill>
+                    <a:schemeClr val="tx1"/>
+                  </a:solidFill>
+                  <a:latin typeface="+mn-lt"/>
+                  <a:ea typeface="+mn-ea"/>
+                  <a:cs typeface="+mn-cs"/>
+                </a:defRPr>
+              </a:lvl7pPr>
+              <a:lvl8pPr marL="3429000" indent="-228600" algn="l" defTabSz="914400" rtl="0" eaLnBrk="1" latinLnBrk="0" hangingPunct="1">
+                <a:lnSpc>
+                  <a:spcPct val="90000"/>
+                </a:lnSpc>
+                <a:spcBef>
+                  <a:spcPts val="500"/>
+                </a:spcBef>
+                <a:buFont typeface="Arial" panose="020B0604020202020204" pitchFamily="34" charset="0"/>
+                <a:buChar char="•"/>
+                <a:defRPr sz="1800" kern="1200">
+                  <a:solidFill>
+                    <a:schemeClr val="tx1"/>
+                  </a:solidFill>
+                  <a:latin typeface="+mn-lt"/>
+                  <a:ea typeface="+mn-ea"/>
+                  <a:cs typeface="+mn-cs"/>
+                </a:defRPr>
+              </a:lvl8pPr>
+              <a:lvl9pPr marL="3886200" indent="-228600" algn="l" defTabSz="914400" rtl="0" eaLnBrk="1" latinLnBrk="0" hangingPunct="1">
+                <a:lnSpc>
+                  <a:spcPct val="90000"/>
+                </a:lnSpc>
+                <a:spcBef>
+                  <a:spcPts val="500"/>
+                </a:spcBef>
+                <a:buFont typeface="Arial" panose="020B0604020202020204" pitchFamily="34" charset="0"/>
+                <a:buChar char="•"/>
+                <a:defRPr sz="1800" kern="1200">
+                  <a:solidFill>
+                    <a:schemeClr val="tx1"/>
+                  </a:solidFill>
+                  <a:latin typeface="+mn-lt"/>
+                  <a:ea typeface="+mn-ea"/>
+                  <a:cs typeface="+mn-cs"/>
+                </a:defRPr>
+              </a:lvl9pPr>
+            </a:lstStyle>
+            <a:p>
+              <a:pPr marL="0" indent="0">
+                <a:buFont typeface="Arial" panose="020B0604020202020204" pitchFamily="34" charset="0"/>
+                <a:buNone/>
+              </a:pPr>
+              <a:r>
+                <a:rPr lang="en-US" sz="2200" dirty="0">
+                  <a:latin typeface="Segoe UI" panose="020B0502040204020203" pitchFamily="34" charset="0"/>
+                  <a:cs typeface="Segoe UI" panose="020B0502040204020203" pitchFamily="34" charset="0"/>
+                </a:rPr>
+                <a:t>10</a:t>
+              </a:r>
+            </a:p>
+            <a:p>
+              <a:pPr marL="0" indent="0">
+                <a:buFont typeface="Arial" panose="020B0604020202020204" pitchFamily="34" charset="0"/>
+                <a:buNone/>
+              </a:pPr>
+              <a:r>
+                <a:rPr lang="en-US" sz="2200" dirty="0">
+                  <a:latin typeface="Segoe UI" panose="020B0502040204020203" pitchFamily="34" charset="0"/>
+                  <a:cs typeface="Segoe UI" panose="020B0502040204020203" pitchFamily="34" charset="0"/>
+                </a:rPr>
+                <a:t>0 3 4 6 7 8 1 6</a:t>
+              </a:r>
+            </a:p>
+            <a:p>
+              <a:pPr marL="0" indent="0">
+                <a:buFont typeface="Arial" panose="020B0604020202020204" pitchFamily="34" charset="0"/>
+                <a:buNone/>
+              </a:pPr>
+              <a:r>
+                <a:rPr lang="en-US" sz="2200" dirty="0">
+                  <a:latin typeface="Segoe UI" panose="020B0502040204020203" pitchFamily="34" charset="0"/>
+                  <a:cs typeface="Segoe UI" panose="020B0502040204020203" pitchFamily="34" charset="0"/>
+                </a:rPr>
+                <a:t>1 5</a:t>
+              </a:r>
+            </a:p>
+            <a:p>
+              <a:pPr marL="0" indent="0">
+                <a:buFont typeface="Arial" panose="020B0604020202020204" pitchFamily="34" charset="0"/>
+                <a:buNone/>
+              </a:pPr>
+              <a:r>
+                <a:rPr lang="en-US" sz="2200" dirty="0">
+                  <a:latin typeface="Segoe UI" panose="020B0502040204020203" pitchFamily="34" charset="0"/>
+                  <a:cs typeface="Segoe UI" panose="020B0502040204020203" pitchFamily="34" charset="0"/>
+                </a:rPr>
+                <a:t>2 3</a:t>
+              </a:r>
+            </a:p>
+            <a:p>
+              <a:pPr marL="0" indent="0">
+                <a:buFont typeface="Arial" panose="020B0604020202020204" pitchFamily="34" charset="0"/>
+                <a:buNone/>
+              </a:pPr>
+              <a:r>
+                <a:rPr lang="en-US" sz="2200" dirty="0">
+                  <a:latin typeface="Segoe UI" panose="020B0502040204020203" pitchFamily="34" charset="0"/>
+                  <a:cs typeface="Segoe UI" panose="020B0502040204020203" pitchFamily="34" charset="0"/>
+                </a:rPr>
+                <a:t>3 0 4 6 7 8 8</a:t>
+              </a:r>
+            </a:p>
+            <a:p>
+              <a:pPr marL="0" indent="0">
+                <a:buFont typeface="Arial" panose="020B0604020202020204" pitchFamily="34" charset="0"/>
+                <a:buNone/>
+              </a:pPr>
+              <a:r>
+                <a:rPr lang="en-US" sz="2200" dirty="0">
+                  <a:latin typeface="Segoe UI" panose="020B0502040204020203" pitchFamily="34" charset="0"/>
+                  <a:cs typeface="Segoe UI" panose="020B0502040204020203" pitchFamily="34" charset="0"/>
+                </a:rPr>
+                <a:t>4 0 3 6 7 8</a:t>
+              </a:r>
+            </a:p>
+            <a:p>
+              <a:pPr marL="0" indent="0">
+                <a:buFont typeface="Arial" panose="020B0604020202020204" pitchFamily="34" charset="0"/>
+                <a:buNone/>
+              </a:pPr>
+              <a:r>
+                <a:rPr lang="en-US" sz="2200" dirty="0">
+                  <a:latin typeface="Segoe UI" panose="020B0502040204020203" pitchFamily="34" charset="0"/>
+                  <a:cs typeface="Segoe UI" panose="020B0502040204020203" pitchFamily="34" charset="0"/>
+                </a:rPr>
+                <a:t>5 </a:t>
+              </a:r>
+            </a:p>
+            <a:p>
+              <a:pPr marL="0" indent="0">
+                <a:buFont typeface="Arial" panose="020B0604020202020204" pitchFamily="34" charset="0"/>
+                <a:buNone/>
+              </a:pPr>
+              <a:r>
+                <a:rPr lang="en-US" sz="2200" dirty="0">
+                  <a:latin typeface="Segoe UI" panose="020B0502040204020203" pitchFamily="34" charset="0"/>
+                  <a:cs typeface="Segoe UI" panose="020B0502040204020203" pitchFamily="34" charset="0"/>
+                </a:rPr>
+                <a:t>6 0 3 4 7 8</a:t>
+              </a:r>
+            </a:p>
+            <a:p>
+              <a:pPr marL="0" indent="0">
+                <a:buFont typeface="Arial" panose="020B0604020202020204" pitchFamily="34" charset="0"/>
+                <a:buNone/>
+              </a:pPr>
+              <a:r>
+                <a:rPr lang="en-US" sz="2200" dirty="0">
+                  <a:latin typeface="Segoe UI" panose="020B0502040204020203" pitchFamily="34" charset="0"/>
+                  <a:cs typeface="Segoe UI" panose="020B0502040204020203" pitchFamily="34" charset="0"/>
+                </a:rPr>
+                <a:t>7 0 3 4 6 8</a:t>
+              </a:r>
+            </a:p>
+            <a:p>
+              <a:pPr marL="0" indent="0">
+                <a:buFont typeface="Arial" panose="020B0604020202020204" pitchFamily="34" charset="0"/>
+                <a:buNone/>
+              </a:pPr>
+              <a:r>
+                <a:rPr lang="en-US" sz="2200" dirty="0">
+                  <a:latin typeface="Segoe UI" panose="020B0502040204020203" pitchFamily="34" charset="0"/>
+                  <a:cs typeface="Segoe UI" panose="020B0502040204020203" pitchFamily="34" charset="0"/>
+                </a:rPr>
+                <a:t>8 0 3 4 6 7</a:t>
+              </a:r>
+            </a:p>
+            <a:p>
+              <a:pPr marL="0" indent="0">
+                <a:buFont typeface="Arial" panose="020B0604020202020204" pitchFamily="34" charset="0"/>
+                <a:buNone/>
+              </a:pPr>
+              <a:r>
+                <a:rPr lang="en-US" sz="2200" dirty="0">
+                  <a:latin typeface="Segoe UI" panose="020B0502040204020203" pitchFamily="34" charset="0"/>
+                  <a:cs typeface="Segoe UI" panose="020B0502040204020203" pitchFamily="34" charset="0"/>
+                </a:rPr>
+                <a:t>9 </a:t>
+              </a:r>
+              <a:endParaRPr lang="hu-HU" sz="2200" dirty="0">
+                <a:latin typeface="Segoe UI" panose="020B0502040204020203" pitchFamily="34" charset="0"/>
+                <a:cs typeface="Segoe UI" panose="020B0502040204020203" pitchFamily="34" charset="0"/>
+              </a:endParaRPr>
+            </a:p>
+          </p:txBody>
+        </p:sp>
+        <p:sp>
+          <p:nvSpPr>
+            <p:cNvPr id="23" name="TextBox 22">
+              <a:extLst>
+                <a:ext uri="{FF2B5EF4-FFF2-40B4-BE49-F238E27FC236}">
+                  <a16:creationId xmlns:a16="http://schemas.microsoft.com/office/drawing/2014/main" id="{51AA5A6C-9B86-486B-86D7-0F4643749A09}"/>
+                </a:ext>
+              </a:extLst>
+            </p:cNvPr>
+            <p:cNvSpPr txBox="1"/>
+            <p:nvPr/>
+          </p:nvSpPr>
+          <p:spPr>
+            <a:xfrm>
+              <a:off x="7829548" y="5345236"/>
+              <a:ext cx="2343152" cy="923330"/>
+            </a:xfrm>
+            <a:prstGeom prst="rect">
+              <a:avLst/>
+            </a:prstGeom>
+            <a:noFill/>
+          </p:spPr>
+          <p:txBody>
+            <a:bodyPr wrap="square" rtlCol="0">
+              <a:spAutoFit/>
+            </a:bodyPr>
+            <a:lstStyle/>
+            <a:p>
+              <a:pPr algn="ctr"/>
+              <a:r>
+                <a:rPr lang="en-US" dirty="0">
+                  <a:latin typeface="Segoe UI" panose="020B0502040204020203" pitchFamily="34" charset="0"/>
+                  <a:cs typeface="Segoe UI" panose="020B0502040204020203" pitchFamily="34" charset="0"/>
+                </a:rPr>
+                <a:t>Sample input containing a clique of size 6.</a:t>
+              </a:r>
+              <a:endParaRPr lang="hu-HU" dirty="0">
+                <a:latin typeface="Segoe UI" panose="020B0502040204020203" pitchFamily="34" charset="0"/>
+                <a:cs typeface="Segoe UI" panose="020B0502040204020203" pitchFamily="34" charset="0"/>
+              </a:endParaRPr>
+            </a:p>
+          </p:txBody>
+        </p:sp>
+      </p:grpSp>
+    </p:spTree>
+    <p:extLst>
+      <p:ext uri="{BB962C8B-B14F-4D97-AF65-F5344CB8AC3E}">
+        <p14:creationId xmlns:p14="http://schemas.microsoft.com/office/powerpoint/2010/main" val="3266340456"/>
+      </p:ext>
+    </p:extLst>
+  </p:cSld>
+  <p:clrMapOvr>
+    <a:masterClrMapping/>
+  </p:clrMapOvr>
+</p:sld>
+</file>
+
+<file path=ppt/slides/slide4.xml><?xml version="1.0" encoding="utf-8"?>
+<p:sld xmlns:a="http://schemas.openxmlformats.org/drawingml/2006/main" xmlns:r="http://schemas.openxmlformats.org/officeDocument/2006/relationships" xmlns:p="http://schemas.openxmlformats.org/presentationml/2006/main">
+  <p:cSld>
+    <p:spTree>
+      <p:nvGrpSpPr>
+        <p:cNvPr id="1" name=""/>
+        <p:cNvGrpSpPr/>
+        <p:nvPr/>
+      </p:nvGrpSpPr>
+      <p:grpSpPr>
+        <a:xfrm>
+          <a:off x="0" y="0"/>
+          <a:ext cx="0" cy="0"/>
+          <a:chOff x="0" y="0"/>
+          <a:chExt cx="0" cy="0"/>
+        </a:xfrm>
+      </p:grpSpPr>
+      <p:sp>
+        <p:nvSpPr>
+          <p:cNvPr id="4" name="Rectangle: Rounded Corners 3">
+            <a:extLst>
+              <a:ext uri="{FF2B5EF4-FFF2-40B4-BE49-F238E27FC236}">
+                <a16:creationId xmlns:a16="http://schemas.microsoft.com/office/drawing/2014/main" id="{646CC432-DEDD-478C-8289-64F4545C5DDF}"/>
+              </a:ext>
+            </a:extLst>
+          </p:cNvPr>
+          <p:cNvSpPr/>
+          <p:nvPr/>
+        </p:nvSpPr>
+        <p:spPr>
+          <a:xfrm>
+            <a:off x="628650" y="1494692"/>
+            <a:ext cx="6541476" cy="4682271"/>
+          </a:xfrm>
+          <a:prstGeom prst="roundRect">
+            <a:avLst/>
+          </a:prstGeom>
+          <a:solidFill>
+            <a:schemeClr val="bg1">
+              <a:lumMod val="95000"/>
+            </a:schemeClr>
+          </a:solidFill>
+          <a:ln>
+            <a:noFill/>
+          </a:ln>
+          <a:effectLst>
+            <a:outerShdw blurRad="50800" dist="38100" dir="2700000" algn="tl" rotWithShape="0">
+              <a:prstClr val="black">
+                <a:alpha val="40000"/>
+              </a:prstClr>
+            </a:outerShdw>
+          </a:effectLst>
+        </p:spPr>
+        <p:style>
+          <a:lnRef idx="2">
+            <a:schemeClr val="accent1">
+              <a:shade val="50000"/>
+            </a:schemeClr>
+          </a:lnRef>
+          <a:fillRef idx="1">
+            <a:schemeClr val="accent1"/>
+          </a:fillRef>
+          <a:effectRef idx="0">
+            <a:schemeClr val="accent1"/>
+          </a:effectRef>
+          <a:fontRef idx="minor">
+            <a:schemeClr val="lt1"/>
+          </a:fontRef>
+        </p:style>
+        <p:txBody>
+          <a:bodyPr rtlCol="0" anchor="ctr"/>
+          <a:lstStyle/>
+          <a:p>
+            <a:pPr algn="ctr"/>
+            <a:endParaRPr lang="hu-HU"/>
+          </a:p>
+        </p:txBody>
+      </p:sp>
+      <p:sp>
+        <p:nvSpPr>
+          <p:cNvPr id="2" name="Title 1">
+            <a:extLst>
+              <a:ext uri="{FF2B5EF4-FFF2-40B4-BE49-F238E27FC236}">
+                <a16:creationId xmlns:a16="http://schemas.microsoft.com/office/drawing/2014/main" id="{9C508B4B-FACF-42E2-8E36-496ABB6FEA31}"/>
+              </a:ext>
+            </a:extLst>
+          </p:cNvPr>
+          <p:cNvSpPr>
+            <a:spLocks noGrp="1"/>
+          </p:cNvSpPr>
+          <p:nvPr>
+            <p:ph type="title"/>
+          </p:nvPr>
+        </p:nvSpPr>
+        <p:spPr>
+          <a:xfrm>
+            <a:off x="838200" y="365125"/>
+            <a:ext cx="11256390" cy="1325563"/>
+          </a:xfrm>
+        </p:spPr>
+        <p:txBody>
+          <a:bodyPr>
+            <a:normAutofit/>
+          </a:bodyPr>
+          <a:lstStyle/>
+          <a:p>
+            <a:r>
+              <a:rPr lang="en-US" dirty="0">
+                <a:latin typeface="Segoe UI Semibold" panose="020B0702040204020203" pitchFamily="34" charset="0"/>
+                <a:cs typeface="Segoe UI Semibold" panose="020B0702040204020203" pitchFamily="34" charset="0"/>
+              </a:rPr>
+              <a:t>Reduction</a:t>
+            </a:r>
+            <a:endParaRPr lang="hu-HU" dirty="0">
+              <a:latin typeface="Segoe UI Semibold" panose="020B0702040204020203" pitchFamily="34" charset="0"/>
+              <a:cs typeface="Segoe UI Semibold" panose="020B0702040204020203" pitchFamily="34" charset="0"/>
+            </a:endParaRPr>
+          </a:p>
+        </p:txBody>
+      </p:sp>
+      <p:sp>
+        <p:nvSpPr>
+          <p:cNvPr id="3" name="Content Placeholder 2">
+            <a:extLst>
+              <a:ext uri="{FF2B5EF4-FFF2-40B4-BE49-F238E27FC236}">
+                <a16:creationId xmlns:a16="http://schemas.microsoft.com/office/drawing/2014/main" id="{1C3EB100-A0AE-4D03-8FF5-296623074D43}"/>
+              </a:ext>
+            </a:extLst>
+          </p:cNvPr>
+          <p:cNvSpPr>
+            <a:spLocks noGrp="1"/>
+          </p:cNvSpPr>
+          <p:nvPr>
+            <p:ph idx="1"/>
+          </p:nvPr>
+        </p:nvSpPr>
+        <p:spPr>
+          <a:xfrm>
+            <a:off x="838200" y="1690688"/>
+            <a:ext cx="6331926" cy="4486275"/>
+          </a:xfrm>
+        </p:spPr>
+        <p:txBody>
+          <a:bodyPr/>
+          <a:lstStyle/>
+          <a:p>
+            <a:pPr marL="0" indent="0">
+              <a:buNone/>
+            </a:pPr>
+            <a:r>
+              <a:rPr lang="en-US" sz="2200" dirty="0">
+                <a:latin typeface="Segoe UI" panose="020B0502040204020203" pitchFamily="34" charset="0"/>
+                <a:cs typeface="Segoe UI" panose="020B0502040204020203" pitchFamily="34" charset="0"/>
+              </a:rPr>
+              <a:t>To reduce Independent Set to the clique decision problem given a graph G = (V, E), the first step is to construct a complementary graph G’ such that:</a:t>
+            </a:r>
+          </a:p>
+          <a:p>
+            <a:pPr marL="0" indent="0">
+              <a:buNone/>
+            </a:pPr>
+            <a:endParaRPr lang="en-US" sz="2200" dirty="0">
+              <a:latin typeface="Segoe UI" panose="020B0502040204020203" pitchFamily="34" charset="0"/>
+              <a:cs typeface="Segoe UI" panose="020B0502040204020203" pitchFamily="34" charset="0"/>
+            </a:endParaRPr>
+          </a:p>
+          <a:p>
+            <a:pPr marL="0" indent="0">
+              <a:buNone/>
+            </a:pPr>
+            <a:r>
+              <a:rPr lang="en-US" sz="2200" dirty="0">
+                <a:latin typeface="Segoe UI" panose="020B0502040204020203" pitchFamily="34" charset="0"/>
+                <a:cs typeface="Segoe UI" panose="020B0502040204020203" pitchFamily="34" charset="0"/>
+              </a:rPr>
+              <a:t>V’ = V </a:t>
+            </a:r>
+          </a:p>
+          <a:p>
+            <a:pPr marL="0" indent="0">
+              <a:buNone/>
+            </a:pPr>
+            <a:r>
+              <a:rPr lang="en-US" sz="2200" dirty="0">
+                <a:latin typeface="Segoe UI" panose="020B0502040204020203" pitchFamily="34" charset="0"/>
+                <a:cs typeface="Segoe UI" panose="020B0502040204020203" pitchFamily="34" charset="0"/>
+              </a:rPr>
+              <a:t>E’ = all edges </a:t>
+            </a:r>
+            <a:r>
+              <a:rPr lang="en-US" sz="2200" b="1" dirty="0">
+                <a:latin typeface="Segoe UI" panose="020B0502040204020203" pitchFamily="34" charset="0"/>
+                <a:cs typeface="Segoe UI" panose="020B0502040204020203" pitchFamily="34" charset="0"/>
+              </a:rPr>
+              <a:t>not</a:t>
+            </a:r>
+            <a:r>
+              <a:rPr lang="en-US" sz="2200" dirty="0">
+                <a:latin typeface="Segoe UI" panose="020B0502040204020203" pitchFamily="34" charset="0"/>
+                <a:cs typeface="Segoe UI" panose="020B0502040204020203" pitchFamily="34" charset="0"/>
+              </a:rPr>
+              <a:t> present in G.</a:t>
+            </a:r>
+          </a:p>
+          <a:p>
+            <a:pPr marL="0" indent="0">
+              <a:buNone/>
+            </a:pPr>
+            <a:endParaRPr lang="en-US" sz="2200" dirty="0">
+              <a:latin typeface="Segoe UI" panose="020B0502040204020203" pitchFamily="34" charset="0"/>
+              <a:cs typeface="Segoe UI" panose="020B0502040204020203" pitchFamily="34" charset="0"/>
+            </a:endParaRPr>
+          </a:p>
+          <a:p>
+            <a:pPr marL="0" indent="0">
+              <a:buNone/>
+            </a:pPr>
+            <a:r>
+              <a:rPr lang="en-US" sz="2200" dirty="0">
+                <a:latin typeface="Segoe UI" panose="020B0502040204020203" pitchFamily="34" charset="0"/>
+                <a:cs typeface="Segoe UI" panose="020B0502040204020203" pitchFamily="34" charset="0"/>
+              </a:rPr>
+              <a:t>If there is a clique of size k within G, it means that all vertices in the clique are connected to each other. Since E’ contains all edges</a:t>
+            </a:r>
+            <a:r>
+              <a:rPr lang="en-US" sz="2200" b="1" dirty="0">
+                <a:latin typeface="Segoe UI" panose="020B0502040204020203" pitchFamily="34" charset="0"/>
+                <a:cs typeface="Segoe UI" panose="020B0502040204020203" pitchFamily="34" charset="0"/>
+              </a:rPr>
+              <a:t> not</a:t>
+            </a:r>
+            <a:r>
+              <a:rPr lang="en-US" sz="2200" dirty="0">
+                <a:latin typeface="Segoe UI" panose="020B0502040204020203" pitchFamily="34" charset="0"/>
+                <a:cs typeface="Segoe UI" panose="020B0502040204020203" pitchFamily="34" charset="0"/>
+              </a:rPr>
+              <a:t> in G, the vertices of the clique form an independent set in G’ of size k.</a:t>
+            </a:r>
+          </a:p>
+        </p:txBody>
+      </p:sp>
+    </p:spTree>
+    <p:extLst>
+      <p:ext uri="{BB962C8B-B14F-4D97-AF65-F5344CB8AC3E}">
+        <p14:creationId xmlns:p14="http://schemas.microsoft.com/office/powerpoint/2010/main" val="2258896446"/>
+      </p:ext>
+    </p:extLst>
+  </p:cSld>
+  <p:clrMapOvr>
+    <a:masterClrMapping/>
+  </p:clrMapOvr>
+</p:sld>
+</file>
+
+<file path=ppt/slides/slide5.xml><?xml version="1.0" encoding="utf-8"?>
+<p:sld xmlns:a="http://schemas.openxmlformats.org/drawingml/2006/main" xmlns:r="http://schemas.openxmlformats.org/officeDocument/2006/relationships" xmlns:p="http://schemas.openxmlformats.org/presentationml/2006/main">
+  <p:cSld>
+    <p:spTree>
+      <p:nvGrpSpPr>
+        <p:cNvPr id="1" name=""/>
+        <p:cNvGrpSpPr/>
+        <p:nvPr/>
+      </p:nvGrpSpPr>
+      <p:grpSpPr>
+        <a:xfrm>
+          <a:off x="0" y="0"/>
+          <a:ext cx="0" cy="0"/>
+          <a:chOff x="0" y="0"/>
+          <a:chExt cx="0" cy="0"/>
+        </a:xfrm>
+      </p:grpSpPr>
+      <p:sp>
+        <p:nvSpPr>
+          <p:cNvPr id="2" name="Title 1">
+            <a:extLst>
+              <a:ext uri="{FF2B5EF4-FFF2-40B4-BE49-F238E27FC236}">
+                <a16:creationId xmlns:a16="http://schemas.microsoft.com/office/drawing/2014/main" id="{75945223-524E-48B9-BD6D-0AC5864ACD6D}"/>
+              </a:ext>
+            </a:extLst>
+          </p:cNvPr>
+          <p:cNvSpPr>
+            <a:spLocks noGrp="1"/>
+          </p:cNvSpPr>
+          <p:nvPr>
+            <p:ph type="title"/>
+          </p:nvPr>
+        </p:nvSpPr>
+        <p:spPr/>
+        <p:txBody>
+          <a:bodyPr/>
+          <a:lstStyle/>
+          <a:p>
+            <a:endParaRPr lang="hu-HU"/>
+          </a:p>
+        </p:txBody>
+      </p:sp>
+      <p:sp>
+        <p:nvSpPr>
+          <p:cNvPr id="3" name="Content Placeholder 2">
+            <a:extLst>
+              <a:ext uri="{FF2B5EF4-FFF2-40B4-BE49-F238E27FC236}">
+                <a16:creationId xmlns:a16="http://schemas.microsoft.com/office/drawing/2014/main" id="{92FE70CF-BF3D-45C2-841E-505E767264F7}"/>
+              </a:ext>
+            </a:extLst>
+          </p:cNvPr>
+          <p:cNvSpPr>
+            <a:spLocks noGrp="1"/>
+          </p:cNvSpPr>
+          <p:nvPr>
+            <p:ph idx="1"/>
+          </p:nvPr>
+        </p:nvSpPr>
+        <p:spPr/>
+        <p:txBody>
+          <a:bodyPr/>
+          <a:lstStyle/>
+          <a:p>
+            <a:endParaRPr lang="hu-HU" dirty="0"/>
+          </a:p>
+        </p:txBody>
+      </p:sp>
+      <p:pic>
+        <p:nvPicPr>
+          <p:cNvPr id="1026" name="Picture 2">
+            <a:hlinkClick r:id="rId2"/>
+            <a:extLst>
+              <a:ext uri="{FF2B5EF4-FFF2-40B4-BE49-F238E27FC236}">
+                <a16:creationId xmlns:a16="http://schemas.microsoft.com/office/drawing/2014/main" id="{59FE4712-79E6-4708-99C3-B512D1902022}"/>
+              </a:ext>
+            </a:extLst>
+          </p:cNvPr>
+          <p:cNvPicPr>
+            <a:picLocks noChangeAspect="1" noChangeArrowheads="1"/>
+          </p:cNvPicPr>
+          <p:nvPr/>
+        </p:nvPicPr>
+        <p:blipFill>
+          <a:blip r:embed="rId3">
+            <a:extLst>
+              <a:ext uri="{28A0092B-C50C-407E-A947-70E740481C1C}">
+                <a14:useLocalDpi xmlns:a14="http://schemas.microsoft.com/office/drawing/2010/main" val="0"/>
+              </a:ext>
+            </a:extLst>
+          </a:blip>
+          <a:srcRect/>
+          <a:stretch>
+            <a:fillRect/>
+          </a:stretch>
+        </p:blipFill>
+        <p:spPr bwMode="auto">
+          <a:xfrm>
+            <a:off x="4667250" y="2014538"/>
+            <a:ext cx="2857500" cy="2828925"/>
+          </a:xfrm>
+          <a:prstGeom prst="rect">
+            <a:avLst/>
+          </a:prstGeom>
+          <a:noFill/>
+          <a:extLst>
+            <a:ext uri="{909E8E84-426E-40DD-AFC4-6F175D3DCCD1}">
+              <a14:hiddenFill xmlns:a14="http://schemas.microsoft.com/office/drawing/2010/main">
+                <a:solidFill>
+                  <a:srgbClr val="FFFFFF"/>
+                </a:solidFill>
+              </a14:hiddenFill>
+            </a:ext>
+          </a:extLst>
+        </p:spPr>
+      </p:pic>
+    </p:spTree>
+    <p:extLst>
+      <p:ext uri="{BB962C8B-B14F-4D97-AF65-F5344CB8AC3E}">
+        <p14:creationId xmlns:p14="http://schemas.microsoft.com/office/powerpoint/2010/main" val="3175013801"/>
+      </p:ext>
+    </p:extLst>
+  </p:cSld>
+  <p:clrMapOvr>
+    <a:masterClrMapping/>
+  </p:clrMapOvr>
+</p:sld>
+</file>
+
 <file path=ppt/theme/theme1.xml><?xml version="1.0" encoding="utf-8"?>
 <a:theme xmlns:a="http://schemas.openxmlformats.org/drawingml/2006/main" name="Office Theme">
   <a:themeElements>

</xml_diff>